<commit_message>
poster updated with acceptance notice
</commit_message>
<xml_diff>
--- a/Poster-PESGM24-Aryan_Jha.pptx
+++ b/Poster-PESGM24-Aryan_Jha.pptx
@@ -112,14 +112,6 @@
 </p:presentation>
 </file>
 
-<file path=ppt/revisionInfo.xml><?xml version="1.0" encoding="utf-8"?>
-<p1510:revInfo xmlns:a="http://schemas.openxmlformats.org/drawingml/2006/main" xmlns:r="http://schemas.openxmlformats.org/officeDocument/2006/relationships" xmlns:p1510="http://schemas.microsoft.com/office/powerpoint/2015/10/main">
-  <p1510:revLst>
-    <p1510:client id="{4D72D1F4-FF45-49EA-AB1A-D45CCB22B227}" v="1395" dt="2024-07-21T19:11:16.237"/>
-  </p1510:revLst>
-</p1510:revInfo>
-</file>
-
 <file path=ppt/changesInfos/changesInfo1.xml><?xml version="1.0" encoding="utf-8"?>
 <pc:chgInfo xmlns:a="http://schemas.openxmlformats.org/drawingml/2006/main" xmlns:r="http://schemas.openxmlformats.org/officeDocument/2006/relationships" xmlns:ac="http://schemas.microsoft.com/office/drawing/2013/main/command" xmlns:pc="http://schemas.microsoft.com/office/powerpoint/2013/main/command">
   <pc:docChgLst>
@@ -991,6 +983,30 @@
             <ac:picMk id="1026" creationId="{5D910D29-ECC6-51E4-0E65-7C862AB2691F}"/>
           </ac:picMkLst>
         </pc:picChg>
+      </pc:sldChg>
+    </pc:docChg>
+  </pc:docChgLst>
+  <pc:docChgLst>
+    <pc:chgData name="Jha, Aryan Ritwajeet" userId="2aad577e-539b-449b-83a6-8d411f484b4d" providerId="ADAL" clId="{D2C925FF-A51D-4360-BF1A-78214341D5E0}"/>
+    <pc:docChg chg="modSld">
+      <pc:chgData name="Jha, Aryan Ritwajeet" userId="2aad577e-539b-449b-83a6-8d411f484b4d" providerId="ADAL" clId="{D2C925FF-A51D-4360-BF1A-78214341D5E0}" dt="2024-09-13T21:33:37.032" v="23" actId="20577"/>
+      <pc:docMkLst>
+        <pc:docMk/>
+      </pc:docMkLst>
+      <pc:sldChg chg="modSp mod">
+        <pc:chgData name="Jha, Aryan Ritwajeet" userId="2aad577e-539b-449b-83a6-8d411f484b4d" providerId="ADAL" clId="{D2C925FF-A51D-4360-BF1A-78214341D5E0}" dt="2024-09-13T21:33:37.032" v="23" actId="20577"/>
+        <pc:sldMkLst>
+          <pc:docMk/>
+          <pc:sldMk cId="3611642365" sldId="256"/>
+        </pc:sldMkLst>
+        <pc:spChg chg="mod">
+          <ac:chgData name="Jha, Aryan Ritwajeet" userId="2aad577e-539b-449b-83a6-8d411f484b4d" providerId="ADAL" clId="{D2C925FF-A51D-4360-BF1A-78214341D5E0}" dt="2024-09-13T21:33:37.032" v="23" actId="20577"/>
+          <ac:spMkLst>
+            <pc:docMk/>
+            <pc:sldMk cId="3611642365" sldId="256"/>
+            <ac:spMk id="47" creationId="{24D4ADC1-6ED7-5E40-AE96-EDF59CA2FE21}"/>
+          </ac:spMkLst>
+        </pc:spChg>
       </pc:sldChg>
     </pc:docChg>
   </pc:docChgLst>
@@ -1128,7 +1144,7 @@
           <a:p>
             <a:fld id="{FC1FB4AB-9BC1-CE45-86A6-BBCC9E970F2D}" type="datetimeFigureOut">
               <a:rPr lang="en-US" smtClean="0"/>
-              <a:t>7/21/2024</a:t>
+              <a:t>9/13/2024</a:t>
             </a:fld>
             <a:endParaRPr lang="en-US"/>
           </a:p>
@@ -1298,7 +1314,7 @@
           <a:p>
             <a:fld id="{FC1FB4AB-9BC1-CE45-86A6-BBCC9E970F2D}" type="datetimeFigureOut">
               <a:rPr lang="en-US" smtClean="0"/>
-              <a:t>7/21/2024</a:t>
+              <a:t>9/13/2024</a:t>
             </a:fld>
             <a:endParaRPr lang="en-US"/>
           </a:p>
@@ -1478,7 +1494,7 @@
           <a:p>
             <a:fld id="{FC1FB4AB-9BC1-CE45-86A6-BBCC9E970F2D}" type="datetimeFigureOut">
               <a:rPr lang="en-US" smtClean="0"/>
-              <a:t>7/21/2024</a:t>
+              <a:t>9/13/2024</a:t>
             </a:fld>
             <a:endParaRPr lang="en-US"/>
           </a:p>
@@ -1648,7 +1664,7 @@
           <a:p>
             <a:fld id="{FC1FB4AB-9BC1-CE45-86A6-BBCC9E970F2D}" type="datetimeFigureOut">
               <a:rPr lang="en-US" smtClean="0"/>
-              <a:t>7/21/2024</a:t>
+              <a:t>9/13/2024</a:t>
             </a:fld>
             <a:endParaRPr lang="en-US"/>
           </a:p>
@@ -1892,7 +1908,7 @@
           <a:p>
             <a:fld id="{FC1FB4AB-9BC1-CE45-86A6-BBCC9E970F2D}" type="datetimeFigureOut">
               <a:rPr lang="en-US" smtClean="0"/>
-              <a:t>7/21/2024</a:t>
+              <a:t>9/13/2024</a:t>
             </a:fld>
             <a:endParaRPr lang="en-US"/>
           </a:p>
@@ -2124,7 +2140,7 @@
           <a:p>
             <a:fld id="{FC1FB4AB-9BC1-CE45-86A6-BBCC9E970F2D}" type="datetimeFigureOut">
               <a:rPr lang="en-US" smtClean="0"/>
-              <a:t>7/21/2024</a:t>
+              <a:t>9/13/2024</a:t>
             </a:fld>
             <a:endParaRPr lang="en-US"/>
           </a:p>
@@ -2491,7 +2507,7 @@
           <a:p>
             <a:fld id="{FC1FB4AB-9BC1-CE45-86A6-BBCC9E970F2D}" type="datetimeFigureOut">
               <a:rPr lang="en-US" smtClean="0"/>
-              <a:t>7/21/2024</a:t>
+              <a:t>9/13/2024</a:t>
             </a:fld>
             <a:endParaRPr lang="en-US"/>
           </a:p>
@@ -2609,7 +2625,7 @@
           <a:p>
             <a:fld id="{FC1FB4AB-9BC1-CE45-86A6-BBCC9E970F2D}" type="datetimeFigureOut">
               <a:rPr lang="en-US" smtClean="0"/>
-              <a:t>7/21/2024</a:t>
+              <a:t>9/13/2024</a:t>
             </a:fld>
             <a:endParaRPr lang="en-US"/>
           </a:p>
@@ -2704,7 +2720,7 @@
           <a:p>
             <a:fld id="{FC1FB4AB-9BC1-CE45-86A6-BBCC9E970F2D}" type="datetimeFigureOut">
               <a:rPr lang="en-US" smtClean="0"/>
-              <a:t>7/21/2024</a:t>
+              <a:t>9/13/2024</a:t>
             </a:fld>
             <a:endParaRPr lang="en-US"/>
           </a:p>
@@ -2981,7 +2997,7 @@
           <a:p>
             <a:fld id="{FC1FB4AB-9BC1-CE45-86A6-BBCC9E970F2D}" type="datetimeFigureOut">
               <a:rPr lang="en-US" smtClean="0"/>
-              <a:t>7/21/2024</a:t>
+              <a:t>9/13/2024</a:t>
             </a:fld>
             <a:endParaRPr lang="en-US"/>
           </a:p>
@@ -3238,7 +3254,7 @@
           <a:p>
             <a:fld id="{FC1FB4AB-9BC1-CE45-86A6-BBCC9E970F2D}" type="datetimeFigureOut">
               <a:rPr lang="en-US" smtClean="0"/>
-              <a:t>7/21/2024</a:t>
+              <a:t>9/13/2024</a:t>
             </a:fld>
             <a:endParaRPr lang="en-US"/>
           </a:p>
@@ -3451,7 +3467,7 @@
           <a:p>
             <a:fld id="{FC1FB4AB-9BC1-CE45-86A6-BBCC9E970F2D}" type="datetimeFigureOut">
               <a:rPr lang="en-US" smtClean="0"/>
-              <a:t>7/21/2024</a:t>
+              <a:t>9/13/2024</a:t>
             </a:fld>
             <a:endParaRPr lang="en-US"/>
           </a:p>
@@ -5465,7 +5481,33 @@
                 <a:effectLst/>
                 <a:latin typeface="Proxima Nova Rg" panose="02000506030000020004"/>
               </a:rPr>
-              <a:t>[Paper submission]. NAPS 2024.</a:t>
+              <a:t>[Accepted </a:t>
+            </a:r>
+            <a:r>
+              <a:rPr kumimoji="0" lang="en-US" altLang="en-US" sz="2400" b="0" i="0" u="none" strike="noStrike" cap="none" normalizeH="0" baseline="0">
+                <a:ln>
+                  <a:noFill/>
+                </a:ln>
+                <a:solidFill>
+                  <a:schemeClr val="tx1"/>
+                </a:solidFill>
+                <a:effectLst/>
+                <a:latin typeface="Proxima Nova Rg" panose="02000506030000020004"/>
+              </a:rPr>
+              <a:t>for Publication]. </a:t>
+            </a:r>
+            <a:r>
+              <a:rPr kumimoji="0" lang="en-US" altLang="en-US" sz="2400" b="0" i="0" u="none" strike="noStrike" cap="none" normalizeH="0" baseline="0" dirty="0">
+                <a:ln>
+                  <a:noFill/>
+                </a:ln>
+                <a:solidFill>
+                  <a:schemeClr val="tx1"/>
+                </a:solidFill>
+                <a:effectLst/>
+                <a:latin typeface="Proxima Nova Rg" panose="02000506030000020004"/>
+              </a:rPr>
+              <a:t>NAPS 2024.</a:t>
             </a:r>
           </a:p>
         </p:txBody>

</xml_diff>